<commit_message>
Something prevent the pull
</commit_message>
<xml_diff>
--- a/Documentation/Training Ninja.pptx
+++ b/Documentation/Training Ninja.pptx
@@ -6624,31 +6624,22 @@
           <a:p>
             <a:pPr lvl="1"/>
             <a:r>
-              <a:rPr lang="en-US" dirty="0" err="1" smtClean="0"/>
+              <a:rPr lang="en-US" dirty="0" smtClean="0"/>
               <a:t>ImproperlyDefinedCreatureException</a:t>
             </a:r>
-            <a:endParaRPr lang="en-US" dirty="0" smtClean="0"/>
           </a:p>
           <a:p>
             <a:pPr lvl="1"/>
             <a:r>
-              <a:rPr lang="en-US" dirty="0" err="1" smtClean="0"/>
-              <a:t>ImproperlyDefinedItemException</a:t>
-            </a:r>
-            <a:r>
               <a:rPr lang="en-US" dirty="0" smtClean="0"/>
-              <a:t> </a:t>
+              <a:t>ImproperlyDefinedItemException </a:t>
             </a:r>
           </a:p>
           <a:p>
             <a:pPr lvl="1"/>
             <a:r>
-              <a:rPr lang="en-US" dirty="0" err="1" smtClean="0"/>
+              <a:rPr lang="en-US" dirty="0" smtClean="0"/>
               <a:t>ImproperlyDefinedBuildingException</a:t>
-            </a:r>
-            <a:r>
-              <a:rPr lang="en-US" dirty="0" smtClean="0"/>
-              <a:t> - ??</a:t>
             </a:r>
             <a:endParaRPr lang="en-US" dirty="0"/>
           </a:p>
@@ -6794,12 +6785,47 @@
           <a:p>
             <a:pPr lvl="1"/>
             <a:r>
+              <a:rPr lang="en-US" dirty="0" smtClean="0">
+                <a:solidFill>
+                  <a:srgbClr val="FF0000"/>
+                </a:solidFill>
+              </a:rPr>
+              <a:t>?? To Do: Identify the polymorphisms in the </a:t>
+            </a:r>
+            <a:r>
+              <a:rPr lang="en-US" dirty="0" smtClean="0">
+                <a:solidFill>
+                  <a:srgbClr val="FF0000"/>
+                </a:solidFill>
+              </a:rPr>
+              <a:t>game</a:t>
+            </a:r>
+          </a:p>
+          <a:p>
+            <a:pPr lvl="1"/>
+            <a:r>
               <a:rPr lang="en-US" dirty="0" smtClean="0"/>
-              <a:t>?? To Do: Identify the polymorphisms in the game</a:t>
-            </a:r>
-          </a:p>
-          <a:p>
-            <a:pPr lvl="1"/>
+              <a:t>Example: </a:t>
+            </a:r>
+            <a:r>
+              <a:rPr lang="en-US" dirty="0"/>
+              <a:t>int damage = this.creature.Attack(</a:t>
+            </a:r>
+            <a:r>
+              <a:rPr lang="en-US" dirty="0" err="1"/>
+              <a:t>this.fightRules</a:t>
+            </a:r>
+            <a:r>
+              <a:rPr lang="en-US" dirty="0" smtClean="0"/>
+              <a:t>);</a:t>
+            </a:r>
+            <a:br>
+              <a:rPr lang="en-US" dirty="0" smtClean="0"/>
+            </a:br>
+            <a:r>
+              <a:rPr lang="en-US" dirty="0" smtClean="0"/>
+              <a:t>here the method Attack() is different for all the creatures </a:t>
+            </a:r>
             <a:endParaRPr lang="en-US" dirty="0"/>
           </a:p>
           <a:p>
@@ -6817,9 +6843,26 @@
           <a:p>
             <a:pPr lvl="1"/>
             <a:r>
-              <a:rPr lang="en-US" dirty="0" smtClean="0"/>
-              <a:t>?? No</a:t>
-            </a:r>
+              <a:rPr lang="en-US" dirty="0" smtClean="0">
+                <a:solidFill>
+                  <a:srgbClr val="FF0000"/>
+                </a:solidFill>
+              </a:rPr>
+              <a:t>?? </a:t>
+            </a:r>
+            <a:r>
+              <a:rPr lang="en-US" dirty="0" smtClean="0">
+                <a:solidFill>
+                  <a:srgbClr val="FF0000"/>
+                </a:solidFill>
+              </a:rPr>
+              <a:t>No – do we need coordinate system or something small and changeable to keep some data.</a:t>
+            </a:r>
+            <a:endParaRPr lang="en-US" dirty="0" smtClean="0">
+              <a:solidFill>
+                <a:srgbClr val="FF0000"/>
+              </a:solidFill>
+            </a:endParaRPr>
           </a:p>
           <a:p>
             <a:endParaRPr lang="en-US" dirty="0"/>
@@ -6982,7 +7025,15 @@
             <a:pPr lvl="1"/>
             <a:r>
               <a:rPr lang="en-US" dirty="0" smtClean="0"/>
-              <a:t>Singleton (thread save, lazy version used)</a:t>
+              <a:t>Singleton </a:t>
+            </a:r>
+            <a:r>
+              <a:rPr lang="en-US" dirty="0" smtClean="0"/>
+              <a:t>(lazy </a:t>
+            </a:r>
+            <a:r>
+              <a:rPr lang="en-US" dirty="0" smtClean="0"/>
+              <a:t>version used)</a:t>
             </a:r>
             <a:endParaRPr lang="en-US" dirty="0"/>
           </a:p>
@@ -7226,8 +7277,42 @@
             <a:pPr lvl="1"/>
             <a:r>
               <a:rPr lang="en-US" dirty="0" smtClean="0"/>
-              <a:t>Evils – Attack using polymorphism. (especially Jedi and Boss)</a:t>
-            </a:r>
+              <a:t>Evils – Attack using polymorphism. (especially Jedi and Boss</a:t>
+            </a:r>
+            <a:r>
+              <a:rPr lang="en-US" dirty="0" smtClean="0"/>
+              <a:t>)</a:t>
+            </a:r>
+          </a:p>
+          <a:p>
+            <a:pPr lvl="1"/>
+            <a:r>
+              <a:rPr lang="en-US" dirty="0" smtClean="0"/>
+              <a:t>Data Encapsulation is properly.</a:t>
+            </a:r>
+          </a:p>
+          <a:p>
+            <a:pPr lvl="1"/>
+            <a:r>
+              <a:rPr lang="en-US" dirty="0" smtClean="0"/>
+              <a:t>Events are used in UI</a:t>
+            </a:r>
+          </a:p>
+          <a:p>
+            <a:pPr lvl="1"/>
+            <a:r>
+              <a:rPr lang="en-US" dirty="0" smtClean="0">
+                <a:solidFill>
+                  <a:srgbClr val="FF0000"/>
+                </a:solidFill>
+              </a:rPr>
+              <a:t>?? Cohesion/Coupling??</a:t>
+            </a:r>
+            <a:endParaRPr lang="en-US" dirty="0" smtClean="0">
+              <a:solidFill>
+                <a:srgbClr val="FF0000"/>
+              </a:solidFill>
+            </a:endParaRPr>
           </a:p>
           <a:p>
             <a:pPr lvl="0"/>
@@ -7342,7 +7427,7 @@
               <a:t>Obligatory use </a:t>
             </a:r>
             <a:r>
-              <a:rPr lang="en-US" b="1" dirty="0" err="1"/>
+              <a:rPr lang="en-US" b="1" dirty="0"/>
               <a:t>Git</a:t>
             </a:r>
             <a:r>
@@ -7365,15 +7450,7 @@
             </a:r>
             <a:r>
               <a:rPr lang="en-US" dirty="0"/>
-              <a:t> allowed. Use </a:t>
-            </a:r>
-            <a:r>
-              <a:rPr lang="en-US" dirty="0" err="1"/>
-              <a:t>Git</a:t>
-            </a:r>
-            <a:r>
-              <a:rPr lang="en-US" dirty="0"/>
-              <a:t>.</a:t>
+              <a:t> allowed. Use Git.</a:t>
             </a:r>
           </a:p>
           <a:p>
@@ -7809,23 +7886,25 @@
             <a:pPr lvl="1"/>
             <a:r>
               <a:rPr lang="en-US" dirty="0" smtClean="0"/>
-              <a:t>Static fields and static method used in </a:t>
-            </a:r>
-            <a:r>
-              <a:rPr lang="en-US" dirty="0" err="1" smtClean="0"/>
-              <a:t>RandomEvilName</a:t>
+              <a:t>Static </a:t>
             </a:r>
             <a:r>
               <a:rPr lang="en-US" dirty="0" smtClean="0"/>
-              <a:t> class</a:t>
-            </a:r>
-          </a:p>
-          <a:p>
-            <a:pPr lvl="1"/>
+              <a:t>methods used </a:t>
+            </a:r>
             <a:r>
               <a:rPr lang="en-US" dirty="0" smtClean="0"/>
-              <a:t>Static methods used in Singletons</a:t>
-            </a:r>
+              <a:t>in </a:t>
+            </a:r>
+            <a:r>
+              <a:rPr lang="en-US" dirty="0" smtClean="0"/>
+              <a:t>all</a:t>
+            </a:r>
+            <a:r>
+              <a:rPr lang="en-US" dirty="0" smtClean="0"/>
+              <a:t> Singletons and in the name randomizer</a:t>
+            </a:r>
+            <a:endParaRPr lang="en-US" dirty="0" smtClean="0"/>
           </a:p>
           <a:p>
             <a:pPr lvl="0"/>
@@ -7838,9 +7917,26 @@
           <a:p>
             <a:pPr lvl="1"/>
             <a:r>
-              <a:rPr lang="en-US" dirty="0" smtClean="0"/>
-              <a:t>?? No</a:t>
-            </a:r>
+              <a:rPr lang="en-US" dirty="0" smtClean="0">
+                <a:solidFill>
+                  <a:srgbClr val="FF0000"/>
+                </a:solidFill>
+              </a:rPr>
+              <a:t>?? </a:t>
+            </a:r>
+            <a:r>
+              <a:rPr lang="en-US" dirty="0" smtClean="0">
+                <a:solidFill>
+                  <a:srgbClr val="FF0000"/>
+                </a:solidFill>
+              </a:rPr>
+              <a:t>If we make bag we will have it!</a:t>
+            </a:r>
+            <a:endParaRPr lang="en-US" dirty="0" smtClean="0">
+              <a:solidFill>
+                <a:srgbClr val="FF0000"/>
+              </a:solidFill>
+            </a:endParaRPr>
           </a:p>
           <a:p>
             <a:pPr lvl="0"/>
@@ -7974,19 +8070,15 @@
               <a:t>Implementation of </a:t>
             </a:r>
             <a:r>
-              <a:rPr lang="en-US" b="1" dirty="0" err="1"/>
-              <a:t>IEnumerable</a:t>
-            </a:r>
-            <a:r>
               <a:rPr lang="en-US" b="1" dirty="0"/>
-              <a:t>&lt;T&gt;</a:t>
+              <a:t>IEnumerable&lt;T&gt;</a:t>
             </a:r>
             <a:r>
               <a:rPr lang="en-US" dirty="0"/>
               <a:t>, </a:t>
             </a:r>
             <a:r>
-              <a:rPr lang="en-US" b="1" dirty="0" err="1"/>
+              <a:rPr lang="en-US" b="1" dirty="0"/>
               <a:t>ICloneable</a:t>
             </a:r>
             <a:r>
@@ -7994,12 +8086,8 @@
               <a:t>, </a:t>
             </a:r>
             <a:r>
-              <a:rPr lang="en-US" b="1" dirty="0" err="1"/>
-              <a:t>ToString</a:t>
-            </a:r>
-            <a:r>
               <a:rPr lang="en-US" b="1" dirty="0"/>
-              <a:t>()</a:t>
+              <a:t>ToString()</a:t>
             </a:r>
             <a:r>
               <a:rPr lang="en-US" dirty="0"/>
@@ -8009,42 +8097,50 @@
           <a:p>
             <a:pPr lvl="1"/>
             <a:r>
-              <a:rPr lang="en-US" dirty="0" err="1" smtClean="0"/>
-              <a:t>Iclonable</a:t>
-            </a:r>
-            <a:r>
               <a:rPr lang="en-US" dirty="0" smtClean="0"/>
-              <a:t> Override Implemented</a:t>
+              <a:t>IClonable </a:t>
+            </a:r>
+            <a:r>
+              <a:rPr lang="en-US" dirty="0" smtClean="0"/>
+              <a:t>Override Implemented</a:t>
             </a:r>
           </a:p>
           <a:p>
             <a:pPr lvl="1"/>
             <a:r>
-              <a:rPr lang="en-US" dirty="0" smtClean="0"/>
+              <a:rPr lang="en-US" dirty="0" smtClean="0">
+                <a:solidFill>
+                  <a:srgbClr val="FF0000"/>
+                </a:solidFill>
+              </a:rPr>
               <a:t>?? </a:t>
             </a:r>
             <a:r>
-              <a:rPr lang="en-US" dirty="0" err="1" smtClean="0"/>
-              <a:t>Ienumerable</a:t>
-            </a:r>
-            <a:r>
-              <a:rPr lang="en-US" dirty="0" smtClean="0"/>
-              <a:t>&lt;T&gt; override not implemented ??</a:t>
+              <a:rPr lang="en-US" dirty="0" smtClean="0">
+                <a:solidFill>
+                  <a:srgbClr val="FF0000"/>
+                </a:solidFill>
+              </a:rPr>
+              <a:t>IEnumerable&lt;T</a:t>
+            </a:r>
+            <a:r>
+              <a:rPr lang="en-US" dirty="0" smtClean="0">
+                <a:solidFill>
+                  <a:srgbClr val="FF0000"/>
+                </a:solidFill>
+              </a:rPr>
+              <a:t>&gt; override not implemented ??</a:t>
             </a:r>
           </a:p>
           <a:p>
             <a:pPr lvl="1"/>
             <a:r>
-              <a:rPr lang="en-US" dirty="0" smtClean="0"/>
-              <a:t>?? </a:t>
-            </a:r>
-            <a:r>
-              <a:rPr lang="en-US" dirty="0" err="1" smtClean="0"/>
-              <a:t>ToString</a:t>
-            </a:r>
-            <a:r>
-              <a:rPr lang="en-US" dirty="0" smtClean="0"/>
-              <a:t>() override not implemented ??</a:t>
+              <a:rPr lang="en-US" dirty="0" smtClean="0">
+                <a:solidFill>
+                  <a:srgbClr val="FF0000"/>
+                </a:solidFill>
+              </a:rPr>
+              <a:t>?? ToString() override not implemented ??</a:t>
             </a:r>
           </a:p>
           <a:p>
@@ -8067,8 +8163,25 @@
             <a:pPr lvl="1"/>
             <a:r>
               <a:rPr lang="en-US" dirty="0" smtClean="0"/>
-              <a:t>?? They are too much but not implemented</a:t>
-            </a:r>
+              <a:t>?? They are too much but not </a:t>
+            </a:r>
+            <a:r>
+              <a:rPr lang="en-US" dirty="0" smtClean="0"/>
+              <a:t>implemented </a:t>
+            </a:r>
+            <a:r>
+              <a:rPr lang="en-US" dirty="0" smtClean="0">
+                <a:solidFill>
+                  <a:srgbClr val="FF0000"/>
+                </a:solidFill>
+              </a:rPr>
+              <a:t>I will do it!!</a:t>
+            </a:r>
+            <a:endParaRPr lang="en-US" dirty="0" smtClean="0">
+              <a:solidFill>
+                <a:srgbClr val="FF0000"/>
+              </a:solidFill>
+            </a:endParaRPr>
           </a:p>
           <a:p>
             <a:endParaRPr lang="en-US" dirty="0"/>
@@ -9752,27 +9865,32 @@
           <a:p>
             <a:pPr lvl="1"/>
             <a:r>
-              <a:rPr lang="en-US" dirty="0" err="1" smtClean="0"/>
-              <a:t>Icommercial</a:t>
-            </a:r>
-            <a:r>
               <a:rPr lang="en-US" dirty="0" smtClean="0"/>
-              <a:t> – custom with multiple implementations</a:t>
-            </a:r>
+              <a:t>ICommercial </a:t>
+            </a:r>
+            <a:r>
+              <a:rPr lang="en-US" dirty="0" smtClean="0"/>
+              <a:t>– </a:t>
+            </a:r>
+            <a:r>
+              <a:rPr lang="en-US" dirty="0" smtClean="0"/>
+              <a:t>Implemented in Energizer, SuperPower, Recreation</a:t>
+            </a:r>
+            <a:endParaRPr lang="en-US" dirty="0" smtClean="0"/>
           </a:p>
           <a:p>
             <a:pPr lvl="1"/>
             <a:r>
-              <a:rPr lang="en-US" dirty="0" err="1" smtClean="0"/>
-              <a:t>Icloneable</a:t>
-            </a:r>
-            <a:r>
               <a:rPr lang="en-US" dirty="0" smtClean="0"/>
-              <a:t> – inherited by </a:t>
-            </a:r>
-            <a:r>
-              <a:rPr lang="en-US" dirty="0" err="1" smtClean="0"/>
-              <a:t>Icommercial</a:t>
+              <a:t>ICloneable </a:t>
+            </a:r>
+            <a:r>
+              <a:rPr lang="en-US" dirty="0" smtClean="0"/>
+              <a:t>– inherited by </a:t>
+            </a:r>
+            <a:r>
+              <a:rPr lang="en-US" dirty="0"/>
+              <a:t>ICommercial </a:t>
             </a:r>
             <a:endParaRPr lang="en-US" dirty="0"/>
           </a:p>
@@ -9780,22 +9898,81 @@
             <a:pPr lvl="1"/>
             <a:r>
               <a:rPr lang="en-US" dirty="0" smtClean="0"/>
-              <a:t>?</a:t>
-            </a:r>
+              <a:t>IItem – inherited by </a:t>
+            </a:r>
+            <a:r>
+              <a:rPr lang="en-US" dirty="0"/>
+              <a:t>ICommercial </a:t>
+            </a:r>
+            <a:r>
+              <a:rPr lang="en-US" dirty="0" smtClean="0"/>
+              <a:t>, </a:t>
+            </a:r>
+            <a:r>
+              <a:rPr lang="en-US" dirty="0"/>
+              <a:t>IAttack </a:t>
+            </a:r>
+            <a:r>
+              <a:rPr lang="en-US" dirty="0" smtClean="0"/>
+              <a:t>– multiple implementations</a:t>
+            </a:r>
+            <a:endParaRPr lang="en-US" dirty="0" smtClean="0"/>
           </a:p>
           <a:p>
             <a:pPr lvl="1"/>
             <a:r>
               <a:rPr lang="en-US" dirty="0" smtClean="0"/>
-              <a:t>?</a:t>
-            </a:r>
+              <a:t>IAttack – Implemented in Power And SuperPower</a:t>
+            </a:r>
+            <a:endParaRPr lang="en-US" dirty="0" smtClean="0"/>
           </a:p>
           <a:p>
             <a:pPr lvl="1"/>
             <a:r>
-              <a:rPr lang="en-US" dirty="0" smtClean="0"/>
-              <a:t>?</a:t>
-            </a:r>
+              <a:rPr lang="en-US" dirty="0" smtClean="0">
+                <a:solidFill>
+                  <a:srgbClr val="FF0000"/>
+                </a:solidFill>
+              </a:rPr>
+              <a:t>?? Suggestion to implement </a:t>
+            </a:r>
+            <a:r>
+              <a:rPr lang="en-US" dirty="0" err="1" smtClean="0">
+                <a:solidFill>
+                  <a:srgbClr val="FF0000"/>
+                </a:solidFill>
+              </a:rPr>
+              <a:t>IIenumerable</a:t>
+            </a:r>
+            <a:r>
+              <a:rPr lang="en-US" dirty="0" smtClean="0">
+                <a:solidFill>
+                  <a:srgbClr val="FF0000"/>
+                </a:solidFill>
+              </a:rPr>
+              <a:t>&lt;</a:t>
+            </a:r>
+            <a:r>
+              <a:rPr lang="en-US" dirty="0" err="1" smtClean="0">
+                <a:solidFill>
+                  <a:srgbClr val="FF0000"/>
+                </a:solidFill>
+              </a:rPr>
+              <a:t>IItems</a:t>
+            </a:r>
+            <a:r>
+              <a:rPr lang="en-US" dirty="0" smtClean="0">
+                <a:solidFill>
+                  <a:srgbClr val="FF0000"/>
+                </a:solidFill>
+              </a:rPr>
+              <a:t>&gt;</a:t>
+            </a:r>
+            <a:endParaRPr lang="en-US" dirty="0" smtClean="0">
+              <a:solidFill>
+                <a:srgbClr val="FF0000"/>
+              </a:solidFill>
+            </a:endParaRPr>
           </a:p>
           <a:p>
             <a:pPr lvl="0"/>

</xml_diff>